<commit_message>
Added kNN to presentation
</commit_message>
<xml_diff>
--- a/FinalPresentation_LE.pptx
+++ b/FinalPresentation_LE.pptx
@@ -5,7 +5,7 @@
     <p:sldMasterId id="2147483648" r:id="rId1"/>
   </p:sldMasterIdLst>
   <p:notesMasterIdLst>
-    <p:notesMasterId r:id="rId18"/>
+    <p:notesMasterId r:id="rId25"/>
   </p:notesMasterIdLst>
   <p:sldIdLst>
     <p:sldId id="256" r:id="rId2"/>
@@ -19,11 +19,18 @@
     <p:sldId id="259" r:id="rId10"/>
     <p:sldId id="268" r:id="rId11"/>
     <p:sldId id="260" r:id="rId12"/>
-    <p:sldId id="261" r:id="rId13"/>
-    <p:sldId id="262" r:id="rId14"/>
-    <p:sldId id="263" r:id="rId15"/>
-    <p:sldId id="264" r:id="rId16"/>
-    <p:sldId id="265" r:id="rId17"/>
+    <p:sldId id="262" r:id="rId13"/>
+    <p:sldId id="272" r:id="rId14"/>
+    <p:sldId id="273" r:id="rId15"/>
+    <p:sldId id="274" r:id="rId16"/>
+    <p:sldId id="275" r:id="rId17"/>
+    <p:sldId id="276" r:id="rId18"/>
+    <p:sldId id="277" r:id="rId19"/>
+    <p:sldId id="278" r:id="rId20"/>
+    <p:sldId id="261" r:id="rId21"/>
+    <p:sldId id="263" r:id="rId22"/>
+    <p:sldId id="264" r:id="rId23"/>
+    <p:sldId id="265" r:id="rId24"/>
   </p:sldIdLst>
   <p:sldSz cx="12192000" cy="6858000"/>
   <p:notesSz cx="6858000" cy="9144000"/>
@@ -122,6 +129,11 @@
       </a:defRPr>
     </a:lvl9pPr>
   </p:defaultTextStyle>
+  <p:extLst>
+    <p:ext uri="{EFAFB233-063F-42B5-8137-9DF3F51BA10A}">
+      <p15:sldGuideLst xmlns:p15="http://schemas.microsoft.com/office/powerpoint/2012/main"/>
+    </p:ext>
+  </p:extLst>
 </p:presentation>
 </file>
 
@@ -207,7 +219,7 @@
           <a:p>
             <a:fld id="{11D63A53-12F1-455E-818C-D992A80074D3}" type="datetimeFigureOut">
               <a:rPr lang="de-AT" smtClean="0"/>
-              <a:t>03.06.2025</a:t>
+              <a:t>04.06.2025</a:t>
             </a:fld>
             <a:endParaRPr lang="de-AT"/>
           </a:p>
@@ -583,6 +595,594 @@
 </p:notes>
 </file>
 
+<file path=ppt/notesSlides/notesSlide10.xml><?xml version="1.0" encoding="utf-8"?>
+<p:notes xmlns:a="http://schemas.openxmlformats.org/drawingml/2006/main" xmlns:r="http://schemas.openxmlformats.org/officeDocument/2006/relationships" xmlns:p="http://schemas.openxmlformats.org/presentationml/2006/main">
+  <p:cSld>
+    <p:spTree>
+      <p:nvGrpSpPr>
+        <p:cNvPr id="1" name=""/>
+        <p:cNvGrpSpPr/>
+        <p:nvPr/>
+      </p:nvGrpSpPr>
+      <p:grpSpPr>
+        <a:xfrm>
+          <a:off x="0" y="0"/>
+          <a:ext cx="0" cy="0"/>
+          <a:chOff x="0" y="0"/>
+          <a:chExt cx="0" cy="0"/>
+        </a:xfrm>
+      </p:grpSpPr>
+      <p:sp>
+        <p:nvSpPr>
+          <p:cNvPr id="2" name="Folienbildplatzhalter 1"/>
+          <p:cNvSpPr>
+            <a:spLocks noGrp="1" noRot="1" noChangeAspect="1"/>
+          </p:cNvSpPr>
+          <p:nvPr>
+            <p:ph type="sldImg"/>
+          </p:nvPr>
+        </p:nvSpPr>
+        <p:spPr/>
+      </p:sp>
+      <p:sp>
+        <p:nvSpPr>
+          <p:cNvPr id="3" name="Notizenplatzhalter 2"/>
+          <p:cNvSpPr>
+            <a:spLocks noGrp="1"/>
+          </p:cNvSpPr>
+          <p:nvPr>
+            <p:ph type="body" idx="1"/>
+          </p:nvPr>
+        </p:nvSpPr>
+        <p:spPr/>
+        <p:txBody>
+          <a:bodyPr/>
+          <a:lstStyle/>
+          <a:p>
+            <a:endParaRPr lang="de-AT" dirty="0"/>
+          </a:p>
+        </p:txBody>
+      </p:sp>
+      <p:sp>
+        <p:nvSpPr>
+          <p:cNvPr id="4" name="Foliennummernplatzhalter 3"/>
+          <p:cNvSpPr>
+            <a:spLocks noGrp="1"/>
+          </p:cNvSpPr>
+          <p:nvPr>
+            <p:ph type="sldNum" sz="quarter" idx="5"/>
+          </p:nvPr>
+        </p:nvSpPr>
+        <p:spPr/>
+        <p:txBody>
+          <a:bodyPr/>
+          <a:lstStyle/>
+          <a:p>
+            <a:fld id="{518D9287-5E3E-4798-9EC8-F0BA4AB97AA3}" type="slidenum">
+              <a:rPr lang="de-AT" smtClean="0"/>
+              <a:t>13</a:t>
+            </a:fld>
+            <a:endParaRPr lang="de-AT"/>
+          </a:p>
+        </p:txBody>
+      </p:sp>
+    </p:spTree>
+    <p:extLst>
+      <p:ext uri="{BB962C8B-B14F-4D97-AF65-F5344CB8AC3E}">
+        <p14:creationId xmlns:p14="http://schemas.microsoft.com/office/powerpoint/2010/main" val="2081164533"/>
+      </p:ext>
+    </p:extLst>
+  </p:cSld>
+  <p:clrMapOvr>
+    <a:masterClrMapping/>
+  </p:clrMapOvr>
+</p:notes>
+</file>
+
+<file path=ppt/notesSlides/notesSlide11.xml><?xml version="1.0" encoding="utf-8"?>
+<p:notes xmlns:a="http://schemas.openxmlformats.org/drawingml/2006/main" xmlns:r="http://schemas.openxmlformats.org/officeDocument/2006/relationships" xmlns:p="http://schemas.openxmlformats.org/presentationml/2006/main">
+  <p:cSld>
+    <p:spTree>
+      <p:nvGrpSpPr>
+        <p:cNvPr id="1" name=""/>
+        <p:cNvGrpSpPr/>
+        <p:nvPr/>
+      </p:nvGrpSpPr>
+      <p:grpSpPr>
+        <a:xfrm>
+          <a:off x="0" y="0"/>
+          <a:ext cx="0" cy="0"/>
+          <a:chOff x="0" y="0"/>
+          <a:chExt cx="0" cy="0"/>
+        </a:xfrm>
+      </p:grpSpPr>
+      <p:sp>
+        <p:nvSpPr>
+          <p:cNvPr id="2" name="Folienbildplatzhalter 1"/>
+          <p:cNvSpPr>
+            <a:spLocks noGrp="1" noRot="1" noChangeAspect="1"/>
+          </p:cNvSpPr>
+          <p:nvPr>
+            <p:ph type="sldImg"/>
+          </p:nvPr>
+        </p:nvSpPr>
+        <p:spPr/>
+      </p:sp>
+      <p:sp>
+        <p:nvSpPr>
+          <p:cNvPr id="3" name="Notizenplatzhalter 2"/>
+          <p:cNvSpPr>
+            <a:spLocks noGrp="1"/>
+          </p:cNvSpPr>
+          <p:nvPr>
+            <p:ph type="body" idx="1"/>
+          </p:nvPr>
+        </p:nvSpPr>
+        <p:spPr/>
+        <p:txBody>
+          <a:bodyPr/>
+          <a:lstStyle/>
+          <a:p>
+            <a:endParaRPr lang="de-AT" dirty="0"/>
+          </a:p>
+        </p:txBody>
+      </p:sp>
+      <p:sp>
+        <p:nvSpPr>
+          <p:cNvPr id="4" name="Foliennummernplatzhalter 3"/>
+          <p:cNvSpPr>
+            <a:spLocks noGrp="1"/>
+          </p:cNvSpPr>
+          <p:nvPr>
+            <p:ph type="sldNum" sz="quarter" idx="5"/>
+          </p:nvPr>
+        </p:nvSpPr>
+        <p:spPr/>
+        <p:txBody>
+          <a:bodyPr/>
+          <a:lstStyle/>
+          <a:p>
+            <a:fld id="{518D9287-5E3E-4798-9EC8-F0BA4AB97AA3}" type="slidenum">
+              <a:rPr lang="de-AT" smtClean="0"/>
+              <a:t>14</a:t>
+            </a:fld>
+            <a:endParaRPr lang="de-AT"/>
+          </a:p>
+        </p:txBody>
+      </p:sp>
+    </p:spTree>
+    <p:extLst>
+      <p:ext uri="{BB962C8B-B14F-4D97-AF65-F5344CB8AC3E}">
+        <p14:creationId xmlns:p14="http://schemas.microsoft.com/office/powerpoint/2010/main" val="3980971592"/>
+      </p:ext>
+    </p:extLst>
+  </p:cSld>
+  <p:clrMapOvr>
+    <a:masterClrMapping/>
+  </p:clrMapOvr>
+</p:notes>
+</file>
+
+<file path=ppt/notesSlides/notesSlide12.xml><?xml version="1.0" encoding="utf-8"?>
+<p:notes xmlns:a="http://schemas.openxmlformats.org/drawingml/2006/main" xmlns:r="http://schemas.openxmlformats.org/officeDocument/2006/relationships" xmlns:p="http://schemas.openxmlformats.org/presentationml/2006/main">
+  <p:cSld>
+    <p:spTree>
+      <p:nvGrpSpPr>
+        <p:cNvPr id="1" name=""/>
+        <p:cNvGrpSpPr/>
+        <p:nvPr/>
+      </p:nvGrpSpPr>
+      <p:grpSpPr>
+        <a:xfrm>
+          <a:off x="0" y="0"/>
+          <a:ext cx="0" cy="0"/>
+          <a:chOff x="0" y="0"/>
+          <a:chExt cx="0" cy="0"/>
+        </a:xfrm>
+      </p:grpSpPr>
+      <p:sp>
+        <p:nvSpPr>
+          <p:cNvPr id="2" name="Folienbildplatzhalter 1"/>
+          <p:cNvSpPr>
+            <a:spLocks noGrp="1" noRot="1" noChangeAspect="1"/>
+          </p:cNvSpPr>
+          <p:nvPr>
+            <p:ph type="sldImg"/>
+          </p:nvPr>
+        </p:nvSpPr>
+        <p:spPr/>
+      </p:sp>
+      <p:sp>
+        <p:nvSpPr>
+          <p:cNvPr id="3" name="Notizenplatzhalter 2"/>
+          <p:cNvSpPr>
+            <a:spLocks noGrp="1"/>
+          </p:cNvSpPr>
+          <p:nvPr>
+            <p:ph type="body" idx="1"/>
+          </p:nvPr>
+        </p:nvSpPr>
+        <p:spPr/>
+        <p:txBody>
+          <a:bodyPr/>
+          <a:lstStyle/>
+          <a:p>
+            <a:endParaRPr lang="de-AT" dirty="0"/>
+          </a:p>
+        </p:txBody>
+      </p:sp>
+      <p:sp>
+        <p:nvSpPr>
+          <p:cNvPr id="4" name="Foliennummernplatzhalter 3"/>
+          <p:cNvSpPr>
+            <a:spLocks noGrp="1"/>
+          </p:cNvSpPr>
+          <p:nvPr>
+            <p:ph type="sldNum" sz="quarter" idx="5"/>
+          </p:nvPr>
+        </p:nvSpPr>
+        <p:spPr/>
+        <p:txBody>
+          <a:bodyPr/>
+          <a:lstStyle/>
+          <a:p>
+            <a:fld id="{518D9287-5E3E-4798-9EC8-F0BA4AB97AA3}" type="slidenum">
+              <a:rPr lang="de-AT" smtClean="0"/>
+              <a:t>15</a:t>
+            </a:fld>
+            <a:endParaRPr lang="de-AT"/>
+          </a:p>
+        </p:txBody>
+      </p:sp>
+    </p:spTree>
+    <p:extLst>
+      <p:ext uri="{BB962C8B-B14F-4D97-AF65-F5344CB8AC3E}">
+        <p14:creationId xmlns:p14="http://schemas.microsoft.com/office/powerpoint/2010/main" val="2869550607"/>
+      </p:ext>
+    </p:extLst>
+  </p:cSld>
+  <p:clrMapOvr>
+    <a:masterClrMapping/>
+  </p:clrMapOvr>
+</p:notes>
+</file>
+
+<file path=ppt/notesSlides/notesSlide13.xml><?xml version="1.0" encoding="utf-8"?>
+<p:notes xmlns:a="http://schemas.openxmlformats.org/drawingml/2006/main" xmlns:r="http://schemas.openxmlformats.org/officeDocument/2006/relationships" xmlns:p="http://schemas.openxmlformats.org/presentationml/2006/main">
+  <p:cSld>
+    <p:spTree>
+      <p:nvGrpSpPr>
+        <p:cNvPr id="1" name=""/>
+        <p:cNvGrpSpPr/>
+        <p:nvPr/>
+      </p:nvGrpSpPr>
+      <p:grpSpPr>
+        <a:xfrm>
+          <a:off x="0" y="0"/>
+          <a:ext cx="0" cy="0"/>
+          <a:chOff x="0" y="0"/>
+          <a:chExt cx="0" cy="0"/>
+        </a:xfrm>
+      </p:grpSpPr>
+      <p:sp>
+        <p:nvSpPr>
+          <p:cNvPr id="2" name="Folienbildplatzhalter 1"/>
+          <p:cNvSpPr>
+            <a:spLocks noGrp="1" noRot="1" noChangeAspect="1"/>
+          </p:cNvSpPr>
+          <p:nvPr>
+            <p:ph type="sldImg"/>
+          </p:nvPr>
+        </p:nvSpPr>
+        <p:spPr/>
+      </p:sp>
+      <p:sp>
+        <p:nvSpPr>
+          <p:cNvPr id="3" name="Notizenplatzhalter 2"/>
+          <p:cNvSpPr>
+            <a:spLocks noGrp="1"/>
+          </p:cNvSpPr>
+          <p:nvPr>
+            <p:ph type="body" idx="1"/>
+          </p:nvPr>
+        </p:nvSpPr>
+        <p:spPr/>
+        <p:txBody>
+          <a:bodyPr/>
+          <a:lstStyle/>
+          <a:p>
+            <a:endParaRPr lang="de-AT" dirty="0"/>
+          </a:p>
+        </p:txBody>
+      </p:sp>
+      <p:sp>
+        <p:nvSpPr>
+          <p:cNvPr id="4" name="Foliennummernplatzhalter 3"/>
+          <p:cNvSpPr>
+            <a:spLocks noGrp="1"/>
+          </p:cNvSpPr>
+          <p:nvPr>
+            <p:ph type="sldNum" sz="quarter" idx="5"/>
+          </p:nvPr>
+        </p:nvSpPr>
+        <p:spPr/>
+        <p:txBody>
+          <a:bodyPr/>
+          <a:lstStyle/>
+          <a:p>
+            <a:fld id="{518D9287-5E3E-4798-9EC8-F0BA4AB97AA3}" type="slidenum">
+              <a:rPr lang="de-AT" smtClean="0"/>
+              <a:t>16</a:t>
+            </a:fld>
+            <a:endParaRPr lang="de-AT"/>
+          </a:p>
+        </p:txBody>
+      </p:sp>
+    </p:spTree>
+    <p:extLst>
+      <p:ext uri="{BB962C8B-B14F-4D97-AF65-F5344CB8AC3E}">
+        <p14:creationId xmlns:p14="http://schemas.microsoft.com/office/powerpoint/2010/main" val="314772731"/>
+      </p:ext>
+    </p:extLst>
+  </p:cSld>
+  <p:clrMapOvr>
+    <a:masterClrMapping/>
+  </p:clrMapOvr>
+</p:notes>
+</file>
+
+<file path=ppt/notesSlides/notesSlide14.xml><?xml version="1.0" encoding="utf-8"?>
+<p:notes xmlns:a="http://schemas.openxmlformats.org/drawingml/2006/main" xmlns:r="http://schemas.openxmlformats.org/officeDocument/2006/relationships" xmlns:p="http://schemas.openxmlformats.org/presentationml/2006/main">
+  <p:cSld>
+    <p:spTree>
+      <p:nvGrpSpPr>
+        <p:cNvPr id="1" name=""/>
+        <p:cNvGrpSpPr/>
+        <p:nvPr/>
+      </p:nvGrpSpPr>
+      <p:grpSpPr>
+        <a:xfrm>
+          <a:off x="0" y="0"/>
+          <a:ext cx="0" cy="0"/>
+          <a:chOff x="0" y="0"/>
+          <a:chExt cx="0" cy="0"/>
+        </a:xfrm>
+      </p:grpSpPr>
+      <p:sp>
+        <p:nvSpPr>
+          <p:cNvPr id="2" name="Folienbildplatzhalter 1"/>
+          <p:cNvSpPr>
+            <a:spLocks noGrp="1" noRot="1" noChangeAspect="1"/>
+          </p:cNvSpPr>
+          <p:nvPr>
+            <p:ph type="sldImg"/>
+          </p:nvPr>
+        </p:nvSpPr>
+        <p:spPr/>
+      </p:sp>
+      <p:sp>
+        <p:nvSpPr>
+          <p:cNvPr id="3" name="Notizenplatzhalter 2"/>
+          <p:cNvSpPr>
+            <a:spLocks noGrp="1"/>
+          </p:cNvSpPr>
+          <p:nvPr>
+            <p:ph type="body" idx="1"/>
+          </p:nvPr>
+        </p:nvSpPr>
+        <p:spPr/>
+        <p:txBody>
+          <a:bodyPr/>
+          <a:lstStyle/>
+          <a:p>
+            <a:endParaRPr lang="de-AT" dirty="0"/>
+          </a:p>
+        </p:txBody>
+      </p:sp>
+      <p:sp>
+        <p:nvSpPr>
+          <p:cNvPr id="4" name="Foliennummernplatzhalter 3"/>
+          <p:cNvSpPr>
+            <a:spLocks noGrp="1"/>
+          </p:cNvSpPr>
+          <p:nvPr>
+            <p:ph type="sldNum" sz="quarter" idx="5"/>
+          </p:nvPr>
+        </p:nvSpPr>
+        <p:spPr/>
+        <p:txBody>
+          <a:bodyPr/>
+          <a:lstStyle/>
+          <a:p>
+            <a:fld id="{518D9287-5E3E-4798-9EC8-F0BA4AB97AA3}" type="slidenum">
+              <a:rPr lang="de-AT" smtClean="0"/>
+              <a:t>17</a:t>
+            </a:fld>
+            <a:endParaRPr lang="de-AT"/>
+          </a:p>
+        </p:txBody>
+      </p:sp>
+    </p:spTree>
+    <p:extLst>
+      <p:ext uri="{BB962C8B-B14F-4D97-AF65-F5344CB8AC3E}">
+        <p14:creationId xmlns:p14="http://schemas.microsoft.com/office/powerpoint/2010/main" val="3602962865"/>
+      </p:ext>
+    </p:extLst>
+  </p:cSld>
+  <p:clrMapOvr>
+    <a:masterClrMapping/>
+  </p:clrMapOvr>
+</p:notes>
+</file>
+
+<file path=ppt/notesSlides/notesSlide15.xml><?xml version="1.0" encoding="utf-8"?>
+<p:notes xmlns:a="http://schemas.openxmlformats.org/drawingml/2006/main" xmlns:r="http://schemas.openxmlformats.org/officeDocument/2006/relationships" xmlns:p="http://schemas.openxmlformats.org/presentationml/2006/main">
+  <p:cSld>
+    <p:spTree>
+      <p:nvGrpSpPr>
+        <p:cNvPr id="1" name=""/>
+        <p:cNvGrpSpPr/>
+        <p:nvPr/>
+      </p:nvGrpSpPr>
+      <p:grpSpPr>
+        <a:xfrm>
+          <a:off x="0" y="0"/>
+          <a:ext cx="0" cy="0"/>
+          <a:chOff x="0" y="0"/>
+          <a:chExt cx="0" cy="0"/>
+        </a:xfrm>
+      </p:grpSpPr>
+      <p:sp>
+        <p:nvSpPr>
+          <p:cNvPr id="2" name="Folienbildplatzhalter 1"/>
+          <p:cNvSpPr>
+            <a:spLocks noGrp="1" noRot="1" noChangeAspect="1"/>
+          </p:cNvSpPr>
+          <p:nvPr>
+            <p:ph type="sldImg"/>
+          </p:nvPr>
+        </p:nvSpPr>
+        <p:spPr/>
+      </p:sp>
+      <p:sp>
+        <p:nvSpPr>
+          <p:cNvPr id="3" name="Notizenplatzhalter 2"/>
+          <p:cNvSpPr>
+            <a:spLocks noGrp="1"/>
+          </p:cNvSpPr>
+          <p:nvPr>
+            <p:ph type="body" idx="1"/>
+          </p:nvPr>
+        </p:nvSpPr>
+        <p:spPr/>
+        <p:txBody>
+          <a:bodyPr/>
+          <a:lstStyle/>
+          <a:p>
+            <a:endParaRPr lang="de-AT" dirty="0"/>
+          </a:p>
+        </p:txBody>
+      </p:sp>
+      <p:sp>
+        <p:nvSpPr>
+          <p:cNvPr id="4" name="Foliennummernplatzhalter 3"/>
+          <p:cNvSpPr>
+            <a:spLocks noGrp="1"/>
+          </p:cNvSpPr>
+          <p:nvPr>
+            <p:ph type="sldNum" sz="quarter" idx="5"/>
+          </p:nvPr>
+        </p:nvSpPr>
+        <p:spPr/>
+        <p:txBody>
+          <a:bodyPr/>
+          <a:lstStyle/>
+          <a:p>
+            <a:fld id="{518D9287-5E3E-4798-9EC8-F0BA4AB97AA3}" type="slidenum">
+              <a:rPr lang="de-AT" smtClean="0"/>
+              <a:t>18</a:t>
+            </a:fld>
+            <a:endParaRPr lang="de-AT"/>
+          </a:p>
+        </p:txBody>
+      </p:sp>
+    </p:spTree>
+    <p:extLst>
+      <p:ext uri="{BB962C8B-B14F-4D97-AF65-F5344CB8AC3E}">
+        <p14:creationId xmlns:p14="http://schemas.microsoft.com/office/powerpoint/2010/main" val="1685786182"/>
+      </p:ext>
+    </p:extLst>
+  </p:cSld>
+  <p:clrMapOvr>
+    <a:masterClrMapping/>
+  </p:clrMapOvr>
+</p:notes>
+</file>
+
+<file path=ppt/notesSlides/notesSlide16.xml><?xml version="1.0" encoding="utf-8"?>
+<p:notes xmlns:a="http://schemas.openxmlformats.org/drawingml/2006/main" xmlns:r="http://schemas.openxmlformats.org/officeDocument/2006/relationships" xmlns:p="http://schemas.openxmlformats.org/presentationml/2006/main">
+  <p:cSld>
+    <p:spTree>
+      <p:nvGrpSpPr>
+        <p:cNvPr id="1" name=""/>
+        <p:cNvGrpSpPr/>
+        <p:nvPr/>
+      </p:nvGrpSpPr>
+      <p:grpSpPr>
+        <a:xfrm>
+          <a:off x="0" y="0"/>
+          <a:ext cx="0" cy="0"/>
+          <a:chOff x="0" y="0"/>
+          <a:chExt cx="0" cy="0"/>
+        </a:xfrm>
+      </p:grpSpPr>
+      <p:sp>
+        <p:nvSpPr>
+          <p:cNvPr id="2" name="Folienbildplatzhalter 1"/>
+          <p:cNvSpPr>
+            <a:spLocks noGrp="1" noRot="1" noChangeAspect="1"/>
+          </p:cNvSpPr>
+          <p:nvPr>
+            <p:ph type="sldImg"/>
+          </p:nvPr>
+        </p:nvSpPr>
+        <p:spPr/>
+      </p:sp>
+      <p:sp>
+        <p:nvSpPr>
+          <p:cNvPr id="3" name="Notizenplatzhalter 2"/>
+          <p:cNvSpPr>
+            <a:spLocks noGrp="1"/>
+          </p:cNvSpPr>
+          <p:nvPr>
+            <p:ph type="body" idx="1"/>
+          </p:nvPr>
+        </p:nvSpPr>
+        <p:spPr/>
+        <p:txBody>
+          <a:bodyPr/>
+          <a:lstStyle/>
+          <a:p>
+            <a:endParaRPr lang="de-AT" dirty="0"/>
+          </a:p>
+        </p:txBody>
+      </p:sp>
+      <p:sp>
+        <p:nvSpPr>
+          <p:cNvPr id="4" name="Foliennummernplatzhalter 3"/>
+          <p:cNvSpPr>
+            <a:spLocks noGrp="1"/>
+          </p:cNvSpPr>
+          <p:nvPr>
+            <p:ph type="sldNum" sz="quarter" idx="5"/>
+          </p:nvPr>
+        </p:nvSpPr>
+        <p:spPr/>
+        <p:txBody>
+          <a:bodyPr/>
+          <a:lstStyle/>
+          <a:p>
+            <a:fld id="{518D9287-5E3E-4798-9EC8-F0BA4AB97AA3}" type="slidenum">
+              <a:rPr lang="de-AT" smtClean="0"/>
+              <a:t>19</a:t>
+            </a:fld>
+            <a:endParaRPr lang="de-AT"/>
+          </a:p>
+        </p:txBody>
+      </p:sp>
+    </p:spTree>
+    <p:extLst>
+      <p:ext uri="{BB962C8B-B14F-4D97-AF65-F5344CB8AC3E}">
+        <p14:creationId xmlns:p14="http://schemas.microsoft.com/office/powerpoint/2010/main" val="3042111658"/>
+      </p:ext>
+    </p:extLst>
+  </p:cSld>
+  <p:clrMapOvr>
+    <a:masterClrMapping/>
+  </p:clrMapOvr>
+</p:notes>
+</file>
+
 <file path=ppt/notesSlides/notesSlide2.xml><?xml version="1.0" encoding="utf-8"?>
 <p:notes xmlns:a="http://schemas.openxmlformats.org/drawingml/2006/main" xmlns:r="http://schemas.openxmlformats.org/officeDocument/2006/relationships" xmlns:p="http://schemas.openxmlformats.org/presentationml/2006/main">
   <p:cSld>
@@ -1646,6 +2246,90 @@
     <p:extLst>
       <p:ext uri="{BB962C8B-B14F-4D97-AF65-F5344CB8AC3E}">
         <p14:creationId xmlns:p14="http://schemas.microsoft.com/office/powerpoint/2010/main" val="882790581"/>
+      </p:ext>
+    </p:extLst>
+  </p:cSld>
+  <p:clrMapOvr>
+    <a:masterClrMapping/>
+  </p:clrMapOvr>
+</p:notes>
+</file>
+
+<file path=ppt/notesSlides/notesSlide9.xml><?xml version="1.0" encoding="utf-8"?>
+<p:notes xmlns:a="http://schemas.openxmlformats.org/drawingml/2006/main" xmlns:r="http://schemas.openxmlformats.org/officeDocument/2006/relationships" xmlns:p="http://schemas.openxmlformats.org/presentationml/2006/main">
+  <p:cSld>
+    <p:spTree>
+      <p:nvGrpSpPr>
+        <p:cNvPr id="1" name=""/>
+        <p:cNvGrpSpPr/>
+        <p:nvPr/>
+      </p:nvGrpSpPr>
+      <p:grpSpPr>
+        <a:xfrm>
+          <a:off x="0" y="0"/>
+          <a:ext cx="0" cy="0"/>
+          <a:chOff x="0" y="0"/>
+          <a:chExt cx="0" cy="0"/>
+        </a:xfrm>
+      </p:grpSpPr>
+      <p:sp>
+        <p:nvSpPr>
+          <p:cNvPr id="2" name="Folienbildplatzhalter 1"/>
+          <p:cNvSpPr>
+            <a:spLocks noGrp="1" noRot="1" noChangeAspect="1"/>
+          </p:cNvSpPr>
+          <p:nvPr>
+            <p:ph type="sldImg"/>
+          </p:nvPr>
+        </p:nvSpPr>
+        <p:spPr/>
+      </p:sp>
+      <p:sp>
+        <p:nvSpPr>
+          <p:cNvPr id="3" name="Notizenplatzhalter 2"/>
+          <p:cNvSpPr>
+            <a:spLocks noGrp="1"/>
+          </p:cNvSpPr>
+          <p:nvPr>
+            <p:ph type="body" idx="1"/>
+          </p:nvPr>
+        </p:nvSpPr>
+        <p:spPr/>
+        <p:txBody>
+          <a:bodyPr/>
+          <a:lstStyle/>
+          <a:p>
+            <a:endParaRPr lang="de-AT" dirty="0"/>
+          </a:p>
+        </p:txBody>
+      </p:sp>
+      <p:sp>
+        <p:nvSpPr>
+          <p:cNvPr id="4" name="Foliennummernplatzhalter 3"/>
+          <p:cNvSpPr>
+            <a:spLocks noGrp="1"/>
+          </p:cNvSpPr>
+          <p:nvPr>
+            <p:ph type="sldNum" sz="quarter" idx="5"/>
+          </p:nvPr>
+        </p:nvSpPr>
+        <p:spPr/>
+        <p:txBody>
+          <a:bodyPr/>
+          <a:lstStyle/>
+          <a:p>
+            <a:fld id="{518D9287-5E3E-4798-9EC8-F0BA4AB97AA3}" type="slidenum">
+              <a:rPr lang="de-AT" smtClean="0"/>
+              <a:t>12</a:t>
+            </a:fld>
+            <a:endParaRPr lang="de-AT"/>
+          </a:p>
+        </p:txBody>
+      </p:sp>
+    </p:spTree>
+    <p:extLst>
+      <p:ext uri="{BB962C8B-B14F-4D97-AF65-F5344CB8AC3E}">
+        <p14:creationId xmlns:p14="http://schemas.microsoft.com/office/powerpoint/2010/main" val="1963439125"/>
       </p:ext>
     </p:extLst>
   </p:cSld>
@@ -1804,7 +2488,7 @@
           <a:p>
             <a:fld id="{BE535EDF-0F33-4B59-912F-68761F335446}" type="datetimeFigureOut">
               <a:rPr lang="de-AT" smtClean="0"/>
-              <a:t>03.06.2025</a:t>
+              <a:t>04.06.2025</a:t>
             </a:fld>
             <a:endParaRPr lang="de-AT"/>
           </a:p>
@@ -2004,7 +2688,7 @@
           <a:p>
             <a:fld id="{BE535EDF-0F33-4B59-912F-68761F335446}" type="datetimeFigureOut">
               <a:rPr lang="de-AT" smtClean="0"/>
-              <a:t>03.06.2025</a:t>
+              <a:t>04.06.2025</a:t>
             </a:fld>
             <a:endParaRPr lang="de-AT"/>
           </a:p>
@@ -2214,7 +2898,7 @@
           <a:p>
             <a:fld id="{BE535EDF-0F33-4B59-912F-68761F335446}" type="datetimeFigureOut">
               <a:rPr lang="de-AT" smtClean="0"/>
-              <a:t>03.06.2025</a:t>
+              <a:t>04.06.2025</a:t>
             </a:fld>
             <a:endParaRPr lang="de-AT"/>
           </a:p>
@@ -2414,7 +3098,7 @@
           <a:p>
             <a:fld id="{BE535EDF-0F33-4B59-912F-68761F335446}" type="datetimeFigureOut">
               <a:rPr lang="de-AT" smtClean="0"/>
-              <a:t>03.06.2025</a:t>
+              <a:t>04.06.2025</a:t>
             </a:fld>
             <a:endParaRPr lang="de-AT"/>
           </a:p>
@@ -2690,7 +3374,7 @@
           <a:p>
             <a:fld id="{BE535EDF-0F33-4B59-912F-68761F335446}" type="datetimeFigureOut">
               <a:rPr lang="de-AT" smtClean="0"/>
-              <a:t>03.06.2025</a:t>
+              <a:t>04.06.2025</a:t>
             </a:fld>
             <a:endParaRPr lang="de-AT"/>
           </a:p>
@@ -2958,7 +3642,7 @@
           <a:p>
             <a:fld id="{BE535EDF-0F33-4B59-912F-68761F335446}" type="datetimeFigureOut">
               <a:rPr lang="de-AT" smtClean="0"/>
-              <a:t>03.06.2025</a:t>
+              <a:t>04.06.2025</a:t>
             </a:fld>
             <a:endParaRPr lang="de-AT"/>
           </a:p>
@@ -3373,7 +4057,7 @@
           <a:p>
             <a:fld id="{BE535EDF-0F33-4B59-912F-68761F335446}" type="datetimeFigureOut">
               <a:rPr lang="de-AT" smtClean="0"/>
-              <a:t>03.06.2025</a:t>
+              <a:t>04.06.2025</a:t>
             </a:fld>
             <a:endParaRPr lang="de-AT"/>
           </a:p>
@@ -3515,7 +4199,7 @@
           <a:p>
             <a:fld id="{BE535EDF-0F33-4B59-912F-68761F335446}" type="datetimeFigureOut">
               <a:rPr lang="de-AT" smtClean="0"/>
-              <a:t>03.06.2025</a:t>
+              <a:t>04.06.2025</a:t>
             </a:fld>
             <a:endParaRPr lang="de-AT"/>
           </a:p>
@@ -3628,7 +4312,7 @@
           <a:p>
             <a:fld id="{BE535EDF-0F33-4B59-912F-68761F335446}" type="datetimeFigureOut">
               <a:rPr lang="de-AT" smtClean="0"/>
-              <a:t>03.06.2025</a:t>
+              <a:t>04.06.2025</a:t>
             </a:fld>
             <a:endParaRPr lang="de-AT"/>
           </a:p>
@@ -3941,7 +4625,7 @@
           <a:p>
             <a:fld id="{BE535EDF-0F33-4B59-912F-68761F335446}" type="datetimeFigureOut">
               <a:rPr lang="de-AT" smtClean="0"/>
-              <a:t>03.06.2025</a:t>
+              <a:t>04.06.2025</a:t>
             </a:fld>
             <a:endParaRPr lang="de-AT"/>
           </a:p>
@@ -4230,7 +4914,7 @@
           <a:p>
             <a:fld id="{BE535EDF-0F33-4B59-912F-68761F335446}" type="datetimeFigureOut">
               <a:rPr lang="de-AT" smtClean="0"/>
-              <a:t>03.06.2025</a:t>
+              <a:t>04.06.2025</a:t>
             </a:fld>
             <a:endParaRPr lang="de-AT"/>
           </a:p>
@@ -4473,7 +5157,7 @@
           <a:p>
             <a:fld id="{BE535EDF-0F33-4B59-912F-68761F335446}" type="datetimeFigureOut">
               <a:rPr lang="de-AT" smtClean="0"/>
-              <a:t>03.06.2025</a:t>
+              <a:t>04.06.2025</a:t>
             </a:fld>
             <a:endParaRPr lang="de-AT"/>
           </a:p>
@@ -5180,10 +5864,87 @@
         </p:nvSpPr>
         <p:spPr/>
         <p:txBody>
-          <a:bodyPr/>
-          <a:lstStyle/>
-          <a:p>
-            <a:endParaRPr lang="de-AT"/>
+          <a:bodyPr>
+            <a:normAutofit lnSpcReduction="10000"/>
+          </a:bodyPr>
+          <a:lstStyle/>
+          <a:p>
+            <a:r>
+              <a:rPr lang="de-DE" dirty="0"/>
+              <a:t>K-</a:t>
+            </a:r>
+            <a:r>
+              <a:rPr lang="de-DE" dirty="0" err="1"/>
+              <a:t>Nearest</a:t>
+            </a:r>
+            <a:r>
+              <a:rPr lang="de-DE" dirty="0"/>
+              <a:t>-</a:t>
+            </a:r>
+            <a:r>
+              <a:rPr lang="de-DE" dirty="0" err="1"/>
+              <a:t>Neighbour</a:t>
+            </a:r>
+            <a:r>
+              <a:rPr lang="de-DE" dirty="0"/>
+              <a:t>:</a:t>
+            </a:r>
+          </a:p>
+          <a:p>
+            <a:pPr lvl="1"/>
+            <a:endParaRPr lang="de-DE" dirty="0"/>
+          </a:p>
+          <a:p>
+            <a:endParaRPr lang="de-DE" dirty="0"/>
+          </a:p>
+          <a:p>
+            <a:r>
+              <a:rPr lang="de-DE" dirty="0" err="1"/>
+              <a:t>Decision</a:t>
+            </a:r>
+            <a:r>
+              <a:rPr lang="de-DE" dirty="0"/>
+              <a:t> </a:t>
+            </a:r>
+            <a:r>
+              <a:rPr lang="de-DE" dirty="0" err="1"/>
+              <a:t>Tree</a:t>
+            </a:r>
+            <a:r>
+              <a:rPr lang="de-DE" dirty="0"/>
+              <a:t>:</a:t>
+            </a:r>
+          </a:p>
+          <a:p>
+            <a:endParaRPr lang="de-DE" dirty="0"/>
+          </a:p>
+          <a:p>
+            <a:endParaRPr lang="de-DE" dirty="0"/>
+          </a:p>
+          <a:p>
+            <a:r>
+              <a:rPr lang="de-DE" dirty="0"/>
+              <a:t>Clustering:</a:t>
+            </a:r>
+          </a:p>
+          <a:p>
+            <a:pPr marL="0" indent="0">
+              <a:buNone/>
+            </a:pPr>
+            <a:endParaRPr lang="de-DE" dirty="0"/>
+          </a:p>
+          <a:p>
+            <a:pPr lvl="1"/>
+            <a:endParaRPr lang="de-DE" dirty="0"/>
+          </a:p>
+          <a:p>
+            <a:pPr marL="457200" lvl="1" indent="0">
+              <a:buNone/>
+            </a:pPr>
+            <a:r>
+              <a:rPr lang="de-DE" dirty="0"/>
+              <a:t>		</a:t>
+            </a:r>
           </a:p>
         </p:txBody>
       </p:sp>
@@ -5201,104 +5962,6 @@
 </file>
 
 <file path=ppt/slides/slide12.xml><?xml version="1.0" encoding="utf-8"?>
-<p:sld xmlns:a="http://schemas.openxmlformats.org/drawingml/2006/main" xmlns:r="http://schemas.openxmlformats.org/officeDocument/2006/relationships" xmlns:p="http://schemas.openxmlformats.org/presentationml/2006/main">
-  <p:cSld>
-    <p:spTree>
-      <p:nvGrpSpPr>
-        <p:cNvPr id="1" name="">
-          <a:extLst>
-            <a:ext uri="{FF2B5EF4-FFF2-40B4-BE49-F238E27FC236}">
-              <a16:creationId xmlns:a16="http://schemas.microsoft.com/office/drawing/2014/main" id="{6B5D8510-F580-0A79-1D03-A8574EA7D708}"/>
-            </a:ext>
-          </a:extLst>
-        </p:cNvPr>
-        <p:cNvGrpSpPr/>
-        <p:nvPr/>
-      </p:nvGrpSpPr>
-      <p:grpSpPr>
-        <a:xfrm>
-          <a:off x="0" y="0"/>
-          <a:ext cx="0" cy="0"/>
-          <a:chOff x="0" y="0"/>
-          <a:chExt cx="0" cy="0"/>
-        </a:xfrm>
-      </p:grpSpPr>
-      <p:sp>
-        <p:nvSpPr>
-          <p:cNvPr id="2" name="Titel 1">
-            <a:extLst>
-              <a:ext uri="{FF2B5EF4-FFF2-40B4-BE49-F238E27FC236}">
-                <a16:creationId xmlns:a16="http://schemas.microsoft.com/office/drawing/2014/main" id="{5C06ADAA-117F-3C72-AE0B-3EA3E8E736AE}"/>
-              </a:ext>
-            </a:extLst>
-          </p:cNvPr>
-          <p:cNvSpPr>
-            <a:spLocks noGrp="1"/>
-          </p:cNvSpPr>
-          <p:nvPr>
-            <p:ph type="title"/>
-          </p:nvPr>
-        </p:nvSpPr>
-        <p:spPr/>
-        <p:txBody>
-          <a:bodyPr/>
-          <a:lstStyle/>
-          <a:p>
-            <a:r>
-              <a:rPr lang="de-AT" dirty="0" err="1"/>
-              <a:t>Decision</a:t>
-            </a:r>
-            <a:r>
-              <a:rPr lang="de-AT" dirty="0"/>
-              <a:t> </a:t>
-            </a:r>
-            <a:r>
-              <a:rPr lang="de-AT" dirty="0" err="1"/>
-              <a:t>Tree</a:t>
-            </a:r>
-            <a:endParaRPr lang="de-AT" dirty="0"/>
-          </a:p>
-        </p:txBody>
-      </p:sp>
-      <p:sp>
-        <p:nvSpPr>
-          <p:cNvPr id="3" name="Inhaltsplatzhalter 2">
-            <a:extLst>
-              <a:ext uri="{FF2B5EF4-FFF2-40B4-BE49-F238E27FC236}">
-                <a16:creationId xmlns:a16="http://schemas.microsoft.com/office/drawing/2014/main" id="{3649568B-9FA9-57D9-444E-7D90E3D7D097}"/>
-              </a:ext>
-            </a:extLst>
-          </p:cNvPr>
-          <p:cNvSpPr>
-            <a:spLocks noGrp="1"/>
-          </p:cNvSpPr>
-          <p:nvPr>
-            <p:ph idx="1"/>
-          </p:nvPr>
-        </p:nvSpPr>
-        <p:spPr/>
-        <p:txBody>
-          <a:bodyPr/>
-          <a:lstStyle/>
-          <a:p>
-            <a:endParaRPr lang="de-AT"/>
-          </a:p>
-        </p:txBody>
-      </p:sp>
-    </p:spTree>
-    <p:extLst>
-      <p:ext uri="{BB962C8B-B14F-4D97-AF65-F5344CB8AC3E}">
-        <p14:creationId xmlns:p14="http://schemas.microsoft.com/office/powerpoint/2010/main" val="3045874594"/>
-      </p:ext>
-    </p:extLst>
-  </p:cSld>
-  <p:clrMapOvr>
-    <a:masterClrMapping/>
-  </p:clrMapOvr>
-</p:sld>
-</file>
-
-<file path=ppt/slides/slide13.xml><?xml version="1.0" encoding="utf-8"?>
 <p:sld xmlns:a="http://schemas.openxmlformats.org/drawingml/2006/main" xmlns:r="http://schemas.openxmlformats.org/officeDocument/2006/relationships" xmlns:p="http://schemas.openxmlformats.org/presentationml/2006/main">
   <p:cSld>
     <p:spTree>
@@ -5349,35 +6012,177 @@
           </a:p>
         </p:txBody>
       </p:sp>
-      <p:sp>
-        <p:nvSpPr>
-          <p:cNvPr id="3" name="Inhaltsplatzhalter 2">
-            <a:extLst>
-              <a:ext uri="{FF2B5EF4-FFF2-40B4-BE49-F238E27FC236}">
-                <a16:creationId xmlns:a16="http://schemas.microsoft.com/office/drawing/2014/main" id="{E2B84972-5D28-69A5-186E-F874DB042EE0}"/>
-              </a:ext>
-            </a:extLst>
-          </p:cNvPr>
-          <p:cNvSpPr>
-            <a:spLocks noGrp="1"/>
-          </p:cNvSpPr>
+      <p:pic>
+        <p:nvPicPr>
+          <p:cNvPr id="1026" name="Picture 2" descr="Using K Nearest Neighbours algorithm in scenario tuning - SAS Users">
+            <a:extLst>
+              <a:ext uri="{FF2B5EF4-FFF2-40B4-BE49-F238E27FC236}">
+                <a16:creationId xmlns:a16="http://schemas.microsoft.com/office/drawing/2014/main" id="{6663ED2A-0E66-5F1A-5C91-747EF4E9B2D5}"/>
+              </a:ext>
+            </a:extLst>
+          </p:cNvPr>
+          <p:cNvPicPr>
+            <a:picLocks noGrp="1" noChangeAspect="1" noChangeArrowheads="1"/>
+          </p:cNvPicPr>
           <p:nvPr>
             <p:ph idx="1"/>
           </p:nvPr>
-        </p:nvSpPr>
-        <p:spPr/>
-        <p:txBody>
-          <a:bodyPr/>
-          <a:lstStyle/>
-          <a:p>
-            <a:endParaRPr lang="de-AT"/>
-          </a:p>
-        </p:txBody>
-      </p:sp>
+        </p:nvPicPr>
+        <p:blipFill>
+          <a:blip r:embed="rId3">
+            <a:extLst>
+              <a:ext uri="{28A0092B-C50C-407E-A947-70E740481C1C}">
+                <a14:useLocalDpi xmlns:a14="http://schemas.microsoft.com/office/drawing/2010/main" val="0"/>
+              </a:ext>
+            </a:extLst>
+          </a:blip>
+          <a:srcRect/>
+          <a:stretch>
+            <a:fillRect/>
+          </a:stretch>
+        </p:blipFill>
+        <p:spPr bwMode="auto">
+          <a:xfrm>
+            <a:off x="1949430" y="1448224"/>
+            <a:ext cx="9105665" cy="5044651"/>
+          </a:xfrm>
+          <a:prstGeom prst="rect">
+            <a:avLst/>
+          </a:prstGeom>
+          <a:noFill/>
+          <a:extLst>
+            <a:ext uri="{909E8E84-426E-40DD-AFC4-6F175D3DCCD1}">
+              <a14:hiddenFill xmlns:a14="http://schemas.microsoft.com/office/drawing/2010/main">
+                <a:solidFill>
+                  <a:srgbClr val="FFFFFF"/>
+                </a:solidFill>
+              </a14:hiddenFill>
+            </a:ext>
+          </a:extLst>
+        </p:spPr>
+      </p:pic>
     </p:spTree>
     <p:extLst>
       <p:ext uri="{BB962C8B-B14F-4D97-AF65-F5344CB8AC3E}">
         <p14:creationId xmlns:p14="http://schemas.microsoft.com/office/powerpoint/2010/main" val="1556808652"/>
+      </p:ext>
+    </p:extLst>
+  </p:cSld>
+  <p:clrMapOvr>
+    <a:masterClrMapping/>
+  </p:clrMapOvr>
+</p:sld>
+</file>
+
+<file path=ppt/slides/slide13.xml><?xml version="1.0" encoding="utf-8"?>
+<p:sld xmlns:a="http://schemas.openxmlformats.org/drawingml/2006/main" xmlns:r="http://schemas.openxmlformats.org/officeDocument/2006/relationships" xmlns:p="http://schemas.openxmlformats.org/presentationml/2006/main">
+  <p:cSld>
+    <p:spTree>
+      <p:nvGrpSpPr>
+        <p:cNvPr id="1" name=""/>
+        <p:cNvGrpSpPr/>
+        <p:nvPr/>
+      </p:nvGrpSpPr>
+      <p:grpSpPr>
+        <a:xfrm>
+          <a:off x="0" y="0"/>
+          <a:ext cx="0" cy="0"/>
+          <a:chOff x="0" y="0"/>
+          <a:chExt cx="0" cy="0"/>
+        </a:xfrm>
+      </p:grpSpPr>
+      <p:sp>
+        <p:nvSpPr>
+          <p:cNvPr id="2" name="Titel 1">
+            <a:extLst>
+              <a:ext uri="{FF2B5EF4-FFF2-40B4-BE49-F238E27FC236}">
+                <a16:creationId xmlns:a16="http://schemas.microsoft.com/office/drawing/2014/main" id="{25AB7F69-8FED-6347-6655-85401120EC3A}"/>
+              </a:ext>
+            </a:extLst>
+          </p:cNvPr>
+          <p:cNvSpPr>
+            <a:spLocks noGrp="1"/>
+          </p:cNvSpPr>
+          <p:nvPr>
+            <p:ph type="title"/>
+          </p:nvPr>
+        </p:nvSpPr>
+        <p:spPr/>
+        <p:txBody>
+          <a:bodyPr/>
+          <a:lstStyle/>
+          <a:p>
+            <a:r>
+              <a:rPr lang="de-DE" dirty="0"/>
+              <a:t>Distribution </a:t>
+            </a:r>
+            <a:r>
+              <a:rPr lang="de-DE" dirty="0" err="1"/>
+              <a:t>of</a:t>
+            </a:r>
+            <a:r>
+              <a:rPr lang="de-DE" dirty="0"/>
+              <a:t> </a:t>
+            </a:r>
+            <a:r>
+              <a:rPr lang="de-DE" dirty="0" err="1"/>
+              <a:t>the</a:t>
+            </a:r>
+            <a:r>
+              <a:rPr lang="de-DE" dirty="0"/>
+              <a:t> </a:t>
+            </a:r>
+            <a:r>
+              <a:rPr lang="de-DE" dirty="0" err="1"/>
+              <a:t>target</a:t>
+            </a:r>
+            <a:r>
+              <a:rPr lang="de-DE" dirty="0"/>
+              <a:t> variable (Region)</a:t>
+            </a:r>
+            <a:endParaRPr lang="de-AT" dirty="0"/>
+          </a:p>
+        </p:txBody>
+      </p:sp>
+      <p:pic>
+        <p:nvPicPr>
+          <p:cNvPr id="6" name="Inhaltsplatzhalter 5" descr="Ein Bild, das Text, Screenshot, Diagramm, Schrift enthält.&#10;&#10;KI-generierte Inhalte können fehlerhaft sein.">
+            <a:extLst>
+              <a:ext uri="{FF2B5EF4-FFF2-40B4-BE49-F238E27FC236}">
+                <a16:creationId xmlns:a16="http://schemas.microsoft.com/office/drawing/2014/main" id="{61F36BD5-B0ED-E958-5386-10A54D5149E5}"/>
+              </a:ext>
+            </a:extLst>
+          </p:cNvPr>
+          <p:cNvPicPr>
+            <a:picLocks noGrp="1" noChangeAspect="1"/>
+          </p:cNvPicPr>
+          <p:nvPr>
+            <p:ph idx="1"/>
+          </p:nvPr>
+        </p:nvPicPr>
+        <p:blipFill>
+          <a:blip r:embed="rId3">
+            <a:extLst>
+              <a:ext uri="{28A0092B-C50C-407E-A947-70E740481C1C}">
+                <a14:useLocalDpi xmlns:a14="http://schemas.microsoft.com/office/drawing/2010/main" val="0"/>
+              </a:ext>
+            </a:extLst>
+          </a:blip>
+          <a:stretch>
+            <a:fillRect/>
+          </a:stretch>
+        </p:blipFill>
+        <p:spPr>
+          <a:xfrm>
+            <a:off x="1347618" y="1405000"/>
+            <a:ext cx="8856684" cy="5453000"/>
+          </a:xfrm>
+        </p:spPr>
+      </p:pic>
+    </p:spTree>
+    <p:extLst>
+      <p:ext uri="{BB962C8B-B14F-4D97-AF65-F5344CB8AC3E}">
+        <p14:creationId xmlns:p14="http://schemas.microsoft.com/office/powerpoint/2010/main" val="3270406556"/>
       </p:ext>
     </p:extLst>
   </p:cSld>
@@ -5392,13 +6197,7 @@
   <p:cSld>
     <p:spTree>
       <p:nvGrpSpPr>
-        <p:cNvPr id="1" name="">
-          <a:extLst>
-            <a:ext uri="{FF2B5EF4-FFF2-40B4-BE49-F238E27FC236}">
-              <a16:creationId xmlns:a16="http://schemas.microsoft.com/office/drawing/2014/main" id="{27CFBF8F-7015-D778-89D8-89248E9F4844}"/>
-            </a:ext>
-          </a:extLst>
-        </p:cNvPr>
+        <p:cNvPr id="1" name=""/>
         <p:cNvGrpSpPr/>
         <p:nvPr/>
       </p:nvGrpSpPr>
@@ -5415,7 +6214,7 @@
           <p:cNvPr id="2" name="Titel 1">
             <a:extLst>
               <a:ext uri="{FF2B5EF4-FFF2-40B4-BE49-F238E27FC236}">
-                <a16:creationId xmlns:a16="http://schemas.microsoft.com/office/drawing/2014/main" id="{C7E3E6E2-45DD-9A23-6CF1-0558B9A44BFE}"/>
+                <a16:creationId xmlns:a16="http://schemas.microsoft.com/office/drawing/2014/main" id="{A443E462-9390-6196-CE0B-A684860A646C}"/>
               </a:ext>
             </a:extLst>
           </p:cNvPr>
@@ -5432,41 +6231,61 @@
           <a:lstStyle/>
           <a:p>
             <a:r>
-              <a:rPr lang="de-AT" dirty="0"/>
-              <a:t>Clustering</a:t>
-            </a:r>
-          </a:p>
-        </p:txBody>
-      </p:sp>
-      <p:sp>
-        <p:nvSpPr>
-          <p:cNvPr id="3" name="Inhaltsplatzhalter 2">
-            <a:extLst>
-              <a:ext uri="{FF2B5EF4-FFF2-40B4-BE49-F238E27FC236}">
-                <a16:creationId xmlns:a16="http://schemas.microsoft.com/office/drawing/2014/main" id="{D17AB9E0-B6DF-64CE-E427-F4DB4DE62D7F}"/>
-              </a:ext>
-            </a:extLst>
-          </p:cNvPr>
-          <p:cNvSpPr>
-            <a:spLocks noGrp="1"/>
-          </p:cNvSpPr>
-          <p:nvPr>
-            <p:ph idx="1"/>
-          </p:nvPr>
-        </p:nvSpPr>
-        <p:spPr/>
-        <p:txBody>
-          <a:bodyPr/>
-          <a:lstStyle/>
-          <a:p>
-            <a:endParaRPr lang="de-AT"/>
-          </a:p>
-        </p:txBody>
-      </p:sp>
+              <a:rPr lang="de-DE" dirty="0"/>
+              <a:t>Picking </a:t>
+            </a:r>
+            <a:r>
+              <a:rPr lang="de-DE" dirty="0" err="1"/>
+              <a:t>hyperparameter</a:t>
+            </a:r>
+            <a:r>
+              <a:rPr lang="de-DE" dirty="0"/>
+              <a:t> k</a:t>
+            </a:r>
+            <a:endParaRPr lang="de-AT" dirty="0"/>
+          </a:p>
+        </p:txBody>
+      </p:sp>
+      <p:pic>
+        <p:nvPicPr>
+          <p:cNvPr id="5" name="Grafik 4" descr="Ein Bild, das Text, Reihe, Diagramm, Zahl enthält.&#10;&#10;KI-generierte Inhalte können fehlerhaft sein.">
+            <a:extLst>
+              <a:ext uri="{FF2B5EF4-FFF2-40B4-BE49-F238E27FC236}">
+                <a16:creationId xmlns:a16="http://schemas.microsoft.com/office/drawing/2014/main" id="{9FB09C96-41F4-BAE2-5883-768BB61F3BD0}"/>
+              </a:ext>
+            </a:extLst>
+          </p:cNvPr>
+          <p:cNvPicPr>
+            <a:picLocks noChangeAspect="1"/>
+          </p:cNvPicPr>
+          <p:nvPr/>
+        </p:nvPicPr>
+        <p:blipFill>
+          <a:blip r:embed="rId3">
+            <a:extLst>
+              <a:ext uri="{28A0092B-C50C-407E-A947-70E740481C1C}">
+                <a14:useLocalDpi xmlns:a14="http://schemas.microsoft.com/office/drawing/2010/main" val="0"/>
+              </a:ext>
+            </a:extLst>
+          </a:blip>
+          <a:stretch>
+            <a:fillRect/>
+          </a:stretch>
+        </p:blipFill>
+        <p:spPr>
+          <a:xfrm>
+            <a:off x="2298192" y="1371600"/>
+            <a:ext cx="7595616" cy="5486400"/>
+          </a:xfrm>
+          <a:prstGeom prst="rect">
+            <a:avLst/>
+          </a:prstGeom>
+        </p:spPr>
+      </p:pic>
     </p:spTree>
     <p:extLst>
       <p:ext uri="{BB962C8B-B14F-4D97-AF65-F5344CB8AC3E}">
-        <p14:creationId xmlns:p14="http://schemas.microsoft.com/office/powerpoint/2010/main" val="1252316802"/>
+        <p14:creationId xmlns:p14="http://schemas.microsoft.com/office/powerpoint/2010/main" val="1807018085"/>
       </p:ext>
     </p:extLst>
   </p:cSld>
@@ -5481,13 +6300,7 @@
   <p:cSld>
     <p:spTree>
       <p:nvGrpSpPr>
-        <p:cNvPr id="1" name="">
-          <a:extLst>
-            <a:ext uri="{FF2B5EF4-FFF2-40B4-BE49-F238E27FC236}">
-              <a16:creationId xmlns:a16="http://schemas.microsoft.com/office/drawing/2014/main" id="{4B18B721-9BFC-744E-883E-B3E32E8BE4C3}"/>
-            </a:ext>
-          </a:extLst>
-        </p:cNvPr>
+        <p:cNvPr id="1" name=""/>
         <p:cNvGrpSpPr/>
         <p:nvPr/>
       </p:nvGrpSpPr>
@@ -5504,7 +6317,7 @@
           <p:cNvPr id="2" name="Titel 1">
             <a:extLst>
               <a:ext uri="{FF2B5EF4-FFF2-40B4-BE49-F238E27FC236}">
-                <a16:creationId xmlns:a16="http://schemas.microsoft.com/office/drawing/2014/main" id="{CB24CB05-1090-5927-4CE5-D110E26AF0E5}"/>
+                <a16:creationId xmlns:a16="http://schemas.microsoft.com/office/drawing/2014/main" id="{AD0EC3B0-7751-FB12-0400-C57D845E5EE6}"/>
               </a:ext>
             </a:extLst>
           </p:cNvPr>
@@ -5521,49 +6334,69 @@
           <a:lstStyle/>
           <a:p>
             <a:r>
-              <a:rPr lang="de-AT" dirty="0"/>
-              <a:t>Key </a:t>
-            </a:r>
-            <a:r>
-              <a:rPr lang="de-AT" dirty="0" err="1"/>
-              <a:t>Insights</a:t>
-            </a:r>
-            <a:r>
-              <a:rPr lang="de-AT" dirty="0"/>
-              <a:t> </a:t>
-            </a:r>
-          </a:p>
-        </p:txBody>
-      </p:sp>
-      <p:sp>
-        <p:nvSpPr>
-          <p:cNvPr id="3" name="Inhaltsplatzhalter 2">
-            <a:extLst>
-              <a:ext uri="{FF2B5EF4-FFF2-40B4-BE49-F238E27FC236}">
-                <a16:creationId xmlns:a16="http://schemas.microsoft.com/office/drawing/2014/main" id="{C6EA153C-E240-6400-81EF-0691E0D47AD5}"/>
-              </a:ext>
-            </a:extLst>
-          </p:cNvPr>
-          <p:cNvSpPr>
-            <a:spLocks noGrp="1"/>
-          </p:cNvSpPr>
-          <p:nvPr>
-            <p:ph idx="1"/>
-          </p:nvPr>
-        </p:nvSpPr>
-        <p:spPr/>
-        <p:txBody>
-          <a:bodyPr/>
-          <a:lstStyle/>
-          <a:p>
-            <a:endParaRPr lang="de-AT"/>
-          </a:p>
-        </p:txBody>
-      </p:sp>
+              <a:rPr lang="de-DE" dirty="0"/>
+              <a:t>Overall </a:t>
+            </a:r>
+            <a:r>
+              <a:rPr lang="de-DE" dirty="0" err="1"/>
+              <a:t>accuracy</a:t>
+            </a:r>
+            <a:r>
+              <a:rPr lang="de-DE" dirty="0"/>
+              <a:t> and </a:t>
+            </a:r>
+            <a:r>
+              <a:rPr lang="de-DE" dirty="0" err="1"/>
+              <a:t>Confusion</a:t>
+            </a:r>
+            <a:r>
+              <a:rPr lang="de-DE" dirty="0"/>
+              <a:t> Matrix</a:t>
+            </a:r>
+            <a:endParaRPr lang="de-AT" dirty="0"/>
+          </a:p>
+        </p:txBody>
+      </p:sp>
+      <p:pic>
+        <p:nvPicPr>
+          <p:cNvPr id="5" name="Grafik 4" descr="Ein Bild, das Text, Screenshot, Diagramm, parallel enthält.&#10;&#10;KI-generierte Inhalte können fehlerhaft sein.">
+            <a:extLst>
+              <a:ext uri="{FF2B5EF4-FFF2-40B4-BE49-F238E27FC236}">
+                <a16:creationId xmlns:a16="http://schemas.microsoft.com/office/drawing/2014/main" id="{2E3C45CD-2456-1AAA-EBE4-EC695E154D2C}"/>
+              </a:ext>
+            </a:extLst>
+          </p:cNvPr>
+          <p:cNvPicPr>
+            <a:picLocks noChangeAspect="1"/>
+          </p:cNvPicPr>
+          <p:nvPr/>
+        </p:nvPicPr>
+        <p:blipFill>
+          <a:blip r:embed="rId3">
+            <a:extLst>
+              <a:ext uri="{28A0092B-C50C-407E-A947-70E740481C1C}">
+                <a14:useLocalDpi xmlns:a14="http://schemas.microsoft.com/office/drawing/2010/main" val="0"/>
+              </a:ext>
+            </a:extLst>
+          </a:blip>
+          <a:stretch>
+            <a:fillRect/>
+          </a:stretch>
+        </p:blipFill>
+        <p:spPr>
+          <a:xfrm>
+            <a:off x="1781556" y="1256538"/>
+            <a:ext cx="8002089" cy="5601462"/>
+          </a:xfrm>
+          <a:prstGeom prst="rect">
+            <a:avLst/>
+          </a:prstGeom>
+        </p:spPr>
+      </p:pic>
     </p:spTree>
     <p:extLst>
       <p:ext uri="{BB962C8B-B14F-4D97-AF65-F5344CB8AC3E}">
-        <p14:creationId xmlns:p14="http://schemas.microsoft.com/office/powerpoint/2010/main" val="3862909979"/>
+        <p14:creationId xmlns:p14="http://schemas.microsoft.com/office/powerpoint/2010/main" val="893672967"/>
       </p:ext>
     </p:extLst>
   </p:cSld>
@@ -5578,13 +6411,7 @@
   <p:cSld>
     <p:spTree>
       <p:nvGrpSpPr>
-        <p:cNvPr id="1" name="">
-          <a:extLst>
-            <a:ext uri="{FF2B5EF4-FFF2-40B4-BE49-F238E27FC236}">
-              <a16:creationId xmlns:a16="http://schemas.microsoft.com/office/drawing/2014/main" id="{54CF0727-A68F-DC52-1AC0-BD99A086DFC0}"/>
-            </a:ext>
-          </a:extLst>
-        </p:cNvPr>
+        <p:cNvPr id="1" name=""/>
         <p:cNvGrpSpPr/>
         <p:nvPr/>
       </p:nvGrpSpPr>
@@ -5601,7 +6428,7 @@
           <p:cNvPr id="2" name="Titel 1">
             <a:extLst>
               <a:ext uri="{FF2B5EF4-FFF2-40B4-BE49-F238E27FC236}">
-                <a16:creationId xmlns:a16="http://schemas.microsoft.com/office/drawing/2014/main" id="{718B29EA-A57D-6C69-0CB4-339430472808}"/>
+                <a16:creationId xmlns:a16="http://schemas.microsoft.com/office/drawing/2014/main" id="{74BE26F0-F7D9-27DF-3BF5-207FA0086809}"/>
               </a:ext>
             </a:extLst>
           </p:cNvPr>
@@ -5618,46 +6445,344 @@
           <a:lstStyle/>
           <a:p>
             <a:r>
-              <a:rPr lang="de-AT" dirty="0"/>
-              <a:t>Wrap-Up &amp; </a:t>
-            </a:r>
-            <a:r>
-              <a:rPr lang="de-AT" dirty="0" err="1"/>
-              <a:t>Discussion</a:t>
+              <a:rPr lang="de-DE" dirty="0"/>
+              <a:t>Class </a:t>
+            </a:r>
+            <a:r>
+              <a:rPr lang="de-DE" dirty="0" err="1"/>
+              <a:t>distributions</a:t>
             </a:r>
             <a:endParaRPr lang="de-AT" dirty="0"/>
           </a:p>
         </p:txBody>
       </p:sp>
-      <p:sp>
-        <p:nvSpPr>
-          <p:cNvPr id="3" name="Inhaltsplatzhalter 2">
-            <a:extLst>
-              <a:ext uri="{FF2B5EF4-FFF2-40B4-BE49-F238E27FC236}">
-                <a16:creationId xmlns:a16="http://schemas.microsoft.com/office/drawing/2014/main" id="{F34A59FC-7C4F-B703-E613-487FC430C069}"/>
-              </a:ext>
-            </a:extLst>
-          </p:cNvPr>
-          <p:cNvSpPr>
-            <a:spLocks noGrp="1"/>
-          </p:cNvSpPr>
-          <p:nvPr>
-            <p:ph idx="1"/>
-          </p:nvPr>
-        </p:nvSpPr>
-        <p:spPr/>
-        <p:txBody>
-          <a:bodyPr/>
-          <a:lstStyle/>
-          <a:p>
-            <a:endParaRPr lang="de-AT"/>
-          </a:p>
-        </p:txBody>
-      </p:sp>
+      <p:pic>
+        <p:nvPicPr>
+          <p:cNvPr id="7" name="Grafik 6" descr="Ein Bild, das Text, Screenshot, Diagramm, Schrift enthält.&#10;&#10;KI-generierte Inhalte können fehlerhaft sein.">
+            <a:extLst>
+              <a:ext uri="{FF2B5EF4-FFF2-40B4-BE49-F238E27FC236}">
+                <a16:creationId xmlns:a16="http://schemas.microsoft.com/office/drawing/2014/main" id="{80180956-1944-C2C1-D03A-46D9E64E7CAE}"/>
+              </a:ext>
+            </a:extLst>
+          </p:cNvPr>
+          <p:cNvPicPr>
+            <a:picLocks noChangeAspect="1"/>
+          </p:cNvPicPr>
+          <p:nvPr/>
+        </p:nvPicPr>
+        <p:blipFill>
+          <a:blip r:embed="rId3">
+            <a:extLst>
+              <a:ext uri="{28A0092B-C50C-407E-A947-70E740481C1C}">
+                <a14:useLocalDpi xmlns:a14="http://schemas.microsoft.com/office/drawing/2010/main" val="0"/>
+              </a:ext>
+            </a:extLst>
+          </a:blip>
+          <a:stretch>
+            <a:fillRect/>
+          </a:stretch>
+        </p:blipFill>
+        <p:spPr>
+          <a:xfrm>
+            <a:off x="2469642" y="1309370"/>
+            <a:ext cx="7252716" cy="5439537"/>
+          </a:xfrm>
+          <a:prstGeom prst="rect">
+            <a:avLst/>
+          </a:prstGeom>
+        </p:spPr>
+      </p:pic>
     </p:spTree>
     <p:extLst>
       <p:ext uri="{BB962C8B-B14F-4D97-AF65-F5344CB8AC3E}">
-        <p14:creationId xmlns:p14="http://schemas.microsoft.com/office/powerpoint/2010/main" val="1028775870"/>
+        <p14:creationId xmlns:p14="http://schemas.microsoft.com/office/powerpoint/2010/main" val="4161260107"/>
+      </p:ext>
+    </p:extLst>
+  </p:cSld>
+  <p:clrMapOvr>
+    <a:masterClrMapping/>
+  </p:clrMapOvr>
+</p:sld>
+</file>
+
+<file path=ppt/slides/slide17.xml><?xml version="1.0" encoding="utf-8"?>
+<p:sld xmlns:a="http://schemas.openxmlformats.org/drawingml/2006/main" xmlns:r="http://schemas.openxmlformats.org/officeDocument/2006/relationships" xmlns:p="http://schemas.openxmlformats.org/presentationml/2006/main">
+  <p:cSld>
+    <p:spTree>
+      <p:nvGrpSpPr>
+        <p:cNvPr id="1" name=""/>
+        <p:cNvGrpSpPr/>
+        <p:nvPr/>
+      </p:nvGrpSpPr>
+      <p:grpSpPr>
+        <a:xfrm>
+          <a:off x="0" y="0"/>
+          <a:ext cx="0" cy="0"/>
+          <a:chOff x="0" y="0"/>
+          <a:chExt cx="0" cy="0"/>
+        </a:xfrm>
+      </p:grpSpPr>
+      <p:sp>
+        <p:nvSpPr>
+          <p:cNvPr id="2" name="Titel 1">
+            <a:extLst>
+              <a:ext uri="{FF2B5EF4-FFF2-40B4-BE49-F238E27FC236}">
+                <a16:creationId xmlns:a16="http://schemas.microsoft.com/office/drawing/2014/main" id="{12AD0614-4350-9646-EFBE-DC814321F8C8}"/>
+              </a:ext>
+            </a:extLst>
+          </p:cNvPr>
+          <p:cNvSpPr>
+            <a:spLocks noGrp="1"/>
+          </p:cNvSpPr>
+          <p:nvPr>
+            <p:ph type="title"/>
+          </p:nvPr>
+        </p:nvSpPr>
+        <p:spPr/>
+        <p:txBody>
+          <a:bodyPr/>
+          <a:lstStyle/>
+          <a:p>
+            <a:r>
+              <a:rPr lang="de-DE" dirty="0"/>
+              <a:t>Classification Report</a:t>
+            </a:r>
+            <a:endParaRPr lang="de-AT" dirty="0"/>
+          </a:p>
+        </p:txBody>
+      </p:sp>
+      <p:pic>
+        <p:nvPicPr>
+          <p:cNvPr id="5" name="Grafik 4">
+            <a:extLst>
+              <a:ext uri="{FF2B5EF4-FFF2-40B4-BE49-F238E27FC236}">
+                <a16:creationId xmlns:a16="http://schemas.microsoft.com/office/drawing/2014/main" id="{E1759777-F1D1-D5DA-A379-2BFACD52142B}"/>
+              </a:ext>
+            </a:extLst>
+          </p:cNvPr>
+          <p:cNvPicPr>
+            <a:picLocks noChangeAspect="1"/>
+          </p:cNvPicPr>
+          <p:nvPr/>
+        </p:nvPicPr>
+        <p:blipFill>
+          <a:blip r:embed="rId3"/>
+          <a:stretch>
+            <a:fillRect/>
+          </a:stretch>
+        </p:blipFill>
+        <p:spPr>
+          <a:xfrm>
+            <a:off x="2190205" y="1499058"/>
+            <a:ext cx="7811590" cy="5268060"/>
+          </a:xfrm>
+          <a:prstGeom prst="rect">
+            <a:avLst/>
+          </a:prstGeom>
+        </p:spPr>
+      </p:pic>
+    </p:spTree>
+    <p:extLst>
+      <p:ext uri="{BB962C8B-B14F-4D97-AF65-F5344CB8AC3E}">
+        <p14:creationId xmlns:p14="http://schemas.microsoft.com/office/powerpoint/2010/main" val="197449117"/>
+      </p:ext>
+    </p:extLst>
+  </p:cSld>
+  <p:clrMapOvr>
+    <a:masterClrMapping/>
+  </p:clrMapOvr>
+</p:sld>
+</file>
+
+<file path=ppt/slides/slide18.xml><?xml version="1.0" encoding="utf-8"?>
+<p:sld xmlns:a="http://schemas.openxmlformats.org/drawingml/2006/main" xmlns:r="http://schemas.openxmlformats.org/officeDocument/2006/relationships" xmlns:p="http://schemas.openxmlformats.org/presentationml/2006/main">
+  <p:cSld>
+    <p:spTree>
+      <p:nvGrpSpPr>
+        <p:cNvPr id="1" name=""/>
+        <p:cNvGrpSpPr/>
+        <p:nvPr/>
+      </p:nvGrpSpPr>
+      <p:grpSpPr>
+        <a:xfrm>
+          <a:off x="0" y="0"/>
+          <a:ext cx="0" cy="0"/>
+          <a:chOff x="0" y="0"/>
+          <a:chExt cx="0" cy="0"/>
+        </a:xfrm>
+      </p:grpSpPr>
+      <p:sp>
+        <p:nvSpPr>
+          <p:cNvPr id="2" name="Titel 1">
+            <a:extLst>
+              <a:ext uri="{FF2B5EF4-FFF2-40B4-BE49-F238E27FC236}">
+                <a16:creationId xmlns:a16="http://schemas.microsoft.com/office/drawing/2014/main" id="{4797C1E0-B24C-22ED-3E3A-68C4952B7ACD}"/>
+              </a:ext>
+            </a:extLst>
+          </p:cNvPr>
+          <p:cNvSpPr>
+            <a:spLocks noGrp="1"/>
+          </p:cNvSpPr>
+          <p:nvPr>
+            <p:ph type="title"/>
+          </p:nvPr>
+        </p:nvSpPr>
+        <p:spPr/>
+        <p:txBody>
+          <a:bodyPr/>
+          <a:lstStyle/>
+          <a:p>
+            <a:r>
+              <a:rPr lang="de-DE" dirty="0"/>
+              <a:t>Feature </a:t>
+            </a:r>
+            <a:r>
+              <a:rPr lang="de-DE" dirty="0" err="1"/>
+              <a:t>Importance</a:t>
+            </a:r>
+            <a:endParaRPr lang="de-AT" dirty="0"/>
+          </a:p>
+        </p:txBody>
+      </p:sp>
+      <p:pic>
+        <p:nvPicPr>
+          <p:cNvPr id="5" name="Grafik 4" descr="Ein Bild, das Text, Screenshot, Diagramm, Schrift enthält.&#10;&#10;KI-generierte Inhalte können fehlerhaft sein.">
+            <a:extLst>
+              <a:ext uri="{FF2B5EF4-FFF2-40B4-BE49-F238E27FC236}">
+                <a16:creationId xmlns:a16="http://schemas.microsoft.com/office/drawing/2014/main" id="{28F5ADB1-9C2D-4A9D-C5B0-146A516E3B81}"/>
+              </a:ext>
+            </a:extLst>
+          </p:cNvPr>
+          <p:cNvPicPr>
+            <a:picLocks noChangeAspect="1"/>
+          </p:cNvPicPr>
+          <p:nvPr/>
+        </p:nvPicPr>
+        <p:blipFill>
+          <a:blip r:embed="rId3">
+            <a:extLst>
+              <a:ext uri="{28A0092B-C50C-407E-A947-70E740481C1C}">
+                <a14:useLocalDpi xmlns:a14="http://schemas.microsoft.com/office/drawing/2010/main" val="0"/>
+              </a:ext>
+            </a:extLst>
+          </a:blip>
+          <a:stretch>
+            <a:fillRect/>
+          </a:stretch>
+        </p:blipFill>
+        <p:spPr>
+          <a:xfrm>
+            <a:off x="2300478" y="1384554"/>
+            <a:ext cx="7591044" cy="5313731"/>
+          </a:xfrm>
+          <a:prstGeom prst="rect">
+            <a:avLst/>
+          </a:prstGeom>
+        </p:spPr>
+      </p:pic>
+    </p:spTree>
+    <p:extLst>
+      <p:ext uri="{BB962C8B-B14F-4D97-AF65-F5344CB8AC3E}">
+        <p14:creationId xmlns:p14="http://schemas.microsoft.com/office/powerpoint/2010/main" val="2637746734"/>
+      </p:ext>
+    </p:extLst>
+  </p:cSld>
+  <p:clrMapOvr>
+    <a:masterClrMapping/>
+  </p:clrMapOvr>
+</p:sld>
+</file>
+
+<file path=ppt/slides/slide19.xml><?xml version="1.0" encoding="utf-8"?>
+<p:sld xmlns:a="http://schemas.openxmlformats.org/drawingml/2006/main" xmlns:r="http://schemas.openxmlformats.org/officeDocument/2006/relationships" xmlns:p="http://schemas.openxmlformats.org/presentationml/2006/main">
+  <p:cSld>
+    <p:spTree>
+      <p:nvGrpSpPr>
+        <p:cNvPr id="1" name=""/>
+        <p:cNvGrpSpPr/>
+        <p:nvPr/>
+      </p:nvGrpSpPr>
+      <p:grpSpPr>
+        <a:xfrm>
+          <a:off x="0" y="0"/>
+          <a:ext cx="0" cy="0"/>
+          <a:chOff x="0" y="0"/>
+          <a:chExt cx="0" cy="0"/>
+        </a:xfrm>
+      </p:grpSpPr>
+      <p:sp>
+        <p:nvSpPr>
+          <p:cNvPr id="2" name="Titel 1">
+            <a:extLst>
+              <a:ext uri="{FF2B5EF4-FFF2-40B4-BE49-F238E27FC236}">
+                <a16:creationId xmlns:a16="http://schemas.microsoft.com/office/drawing/2014/main" id="{47431B65-2008-FAF1-2434-9601923DCEAE}"/>
+              </a:ext>
+            </a:extLst>
+          </p:cNvPr>
+          <p:cNvSpPr>
+            <a:spLocks noGrp="1"/>
+          </p:cNvSpPr>
+          <p:nvPr>
+            <p:ph type="title"/>
+          </p:nvPr>
+        </p:nvSpPr>
+        <p:spPr/>
+        <p:txBody>
+          <a:bodyPr/>
+          <a:lstStyle/>
+          <a:p>
+            <a:r>
+              <a:rPr lang="de-DE" dirty="0"/>
+              <a:t>T-SNE </a:t>
+            </a:r>
+            <a:r>
+              <a:rPr lang="de-DE" dirty="0" err="1"/>
+              <a:t>Visualization</a:t>
+            </a:r>
+            <a:endParaRPr lang="de-AT" dirty="0"/>
+          </a:p>
+        </p:txBody>
+      </p:sp>
+      <p:pic>
+        <p:nvPicPr>
+          <p:cNvPr id="5" name="Grafik 4" descr="Ein Bild, das Text, Screenshot, Diagramm, Karte enthält.&#10;&#10;KI-generierte Inhalte können fehlerhaft sein.">
+            <a:extLst>
+              <a:ext uri="{FF2B5EF4-FFF2-40B4-BE49-F238E27FC236}">
+                <a16:creationId xmlns:a16="http://schemas.microsoft.com/office/drawing/2014/main" id="{8ECB87BF-9D69-48BD-4015-42A3BC0A15B4}"/>
+              </a:ext>
+            </a:extLst>
+          </p:cNvPr>
+          <p:cNvPicPr>
+            <a:picLocks noChangeAspect="1"/>
+          </p:cNvPicPr>
+          <p:nvPr/>
+        </p:nvPicPr>
+        <p:blipFill>
+          <a:blip r:embed="rId3">
+            <a:extLst>
+              <a:ext uri="{28A0092B-C50C-407E-A947-70E740481C1C}">
+                <a14:useLocalDpi xmlns:a14="http://schemas.microsoft.com/office/drawing/2010/main" val="0"/>
+              </a:ext>
+            </a:extLst>
+          </a:blip>
+          <a:stretch>
+            <a:fillRect/>
+          </a:stretch>
+        </p:blipFill>
+        <p:spPr>
+          <a:xfrm>
+            <a:off x="2345245" y="1252728"/>
+            <a:ext cx="7501509" cy="5413858"/>
+          </a:xfrm>
+          <a:prstGeom prst="rect">
+            <a:avLst/>
+          </a:prstGeom>
+        </p:spPr>
+      </p:pic>
+    </p:spTree>
+    <p:extLst>
+      <p:ext uri="{BB962C8B-B14F-4D97-AF65-F5344CB8AC3E}">
+        <p14:creationId xmlns:p14="http://schemas.microsoft.com/office/powerpoint/2010/main" val="1471698923"/>
       </p:ext>
     </p:extLst>
   </p:cSld>
@@ -5713,43 +6838,418 @@
           </a:p>
         </p:txBody>
       </p:sp>
-      <p:sp>
-        <p:nvSpPr>
-          <p:cNvPr id="3" name="Inhaltsplatzhalter 2">
-            <a:extLst>
-              <a:ext uri="{FF2B5EF4-FFF2-40B4-BE49-F238E27FC236}">
-                <a16:creationId xmlns:a16="http://schemas.microsoft.com/office/drawing/2014/main" id="{65FB57A6-3EA7-A487-69FF-3BD947D2C341}"/>
-              </a:ext>
-            </a:extLst>
-          </p:cNvPr>
-          <p:cNvSpPr>
-            <a:spLocks noGrp="1"/>
-          </p:cNvSpPr>
-          <p:nvPr>
-            <p:ph idx="1"/>
-          </p:nvPr>
-        </p:nvSpPr>
-        <p:spPr/>
-        <p:txBody>
-          <a:bodyPr/>
-          <a:lstStyle/>
-          <a:p>
-            <a:r>
-              <a:rPr lang="de-AT" dirty="0"/>
-              <a:t>PICTURE (</a:t>
-            </a:r>
-            <a:r>
-              <a:rPr lang="de-AT"/>
-              <a:t>welche Features ?)</a:t>
-            </a:r>
-            <a:endParaRPr lang="de-AT" dirty="0"/>
-          </a:p>
-        </p:txBody>
-      </p:sp>
+      <p:pic>
+        <p:nvPicPr>
+          <p:cNvPr id="5" name="Grafik 4">
+            <a:extLst>
+              <a:ext uri="{FF2B5EF4-FFF2-40B4-BE49-F238E27FC236}">
+                <a16:creationId xmlns:a16="http://schemas.microsoft.com/office/drawing/2014/main" id="{3A2EFA6B-E035-1206-270C-9CD2182E6AC7}"/>
+              </a:ext>
+            </a:extLst>
+          </p:cNvPr>
+          <p:cNvPicPr>
+            <a:picLocks noChangeAspect="1"/>
+          </p:cNvPicPr>
+          <p:nvPr/>
+        </p:nvPicPr>
+        <p:blipFill>
+          <a:blip r:embed="rId3"/>
+          <a:stretch>
+            <a:fillRect/>
+          </a:stretch>
+        </p:blipFill>
+        <p:spPr>
+          <a:xfrm>
+            <a:off x="346860" y="2065142"/>
+            <a:ext cx="11498280" cy="3715268"/>
+          </a:xfrm>
+          <a:prstGeom prst="rect">
+            <a:avLst/>
+          </a:prstGeom>
+        </p:spPr>
+      </p:pic>
     </p:spTree>
     <p:extLst>
       <p:ext uri="{BB962C8B-B14F-4D97-AF65-F5344CB8AC3E}">
         <p14:creationId xmlns:p14="http://schemas.microsoft.com/office/powerpoint/2010/main" val="15126874"/>
+      </p:ext>
+    </p:extLst>
+  </p:cSld>
+  <p:clrMapOvr>
+    <a:masterClrMapping/>
+  </p:clrMapOvr>
+</p:sld>
+</file>
+
+<file path=ppt/slides/slide20.xml><?xml version="1.0" encoding="utf-8"?>
+<p:sld xmlns:a="http://schemas.openxmlformats.org/drawingml/2006/main" xmlns:r="http://schemas.openxmlformats.org/officeDocument/2006/relationships" xmlns:p="http://schemas.openxmlformats.org/presentationml/2006/main">
+  <p:cSld>
+    <p:spTree>
+      <p:nvGrpSpPr>
+        <p:cNvPr id="1" name="">
+          <a:extLst>
+            <a:ext uri="{FF2B5EF4-FFF2-40B4-BE49-F238E27FC236}">
+              <a16:creationId xmlns:a16="http://schemas.microsoft.com/office/drawing/2014/main" id="{6B5D8510-F580-0A79-1D03-A8574EA7D708}"/>
+            </a:ext>
+          </a:extLst>
+        </p:cNvPr>
+        <p:cNvGrpSpPr/>
+        <p:nvPr/>
+      </p:nvGrpSpPr>
+      <p:grpSpPr>
+        <a:xfrm>
+          <a:off x="0" y="0"/>
+          <a:ext cx="0" cy="0"/>
+          <a:chOff x="0" y="0"/>
+          <a:chExt cx="0" cy="0"/>
+        </a:xfrm>
+      </p:grpSpPr>
+      <p:sp>
+        <p:nvSpPr>
+          <p:cNvPr id="2" name="Titel 1">
+            <a:extLst>
+              <a:ext uri="{FF2B5EF4-FFF2-40B4-BE49-F238E27FC236}">
+                <a16:creationId xmlns:a16="http://schemas.microsoft.com/office/drawing/2014/main" id="{5C06ADAA-117F-3C72-AE0B-3EA3E8E736AE}"/>
+              </a:ext>
+            </a:extLst>
+          </p:cNvPr>
+          <p:cNvSpPr>
+            <a:spLocks noGrp="1"/>
+          </p:cNvSpPr>
+          <p:nvPr>
+            <p:ph type="title"/>
+          </p:nvPr>
+        </p:nvSpPr>
+        <p:spPr/>
+        <p:txBody>
+          <a:bodyPr/>
+          <a:lstStyle/>
+          <a:p>
+            <a:r>
+              <a:rPr lang="de-AT" dirty="0" err="1"/>
+              <a:t>Decision</a:t>
+            </a:r>
+            <a:r>
+              <a:rPr lang="de-AT" dirty="0"/>
+              <a:t> </a:t>
+            </a:r>
+            <a:r>
+              <a:rPr lang="de-AT" dirty="0" err="1"/>
+              <a:t>Tree</a:t>
+            </a:r>
+            <a:endParaRPr lang="de-AT" dirty="0"/>
+          </a:p>
+        </p:txBody>
+      </p:sp>
+      <p:sp>
+        <p:nvSpPr>
+          <p:cNvPr id="3" name="Inhaltsplatzhalter 2">
+            <a:extLst>
+              <a:ext uri="{FF2B5EF4-FFF2-40B4-BE49-F238E27FC236}">
+                <a16:creationId xmlns:a16="http://schemas.microsoft.com/office/drawing/2014/main" id="{3649568B-9FA9-57D9-444E-7D90E3D7D097}"/>
+              </a:ext>
+            </a:extLst>
+          </p:cNvPr>
+          <p:cNvSpPr>
+            <a:spLocks noGrp="1"/>
+          </p:cNvSpPr>
+          <p:nvPr>
+            <p:ph idx="1"/>
+          </p:nvPr>
+        </p:nvSpPr>
+        <p:spPr/>
+        <p:txBody>
+          <a:bodyPr/>
+          <a:lstStyle/>
+          <a:p>
+            <a:endParaRPr lang="de-AT"/>
+          </a:p>
+        </p:txBody>
+      </p:sp>
+    </p:spTree>
+    <p:extLst>
+      <p:ext uri="{BB962C8B-B14F-4D97-AF65-F5344CB8AC3E}">
+        <p14:creationId xmlns:p14="http://schemas.microsoft.com/office/powerpoint/2010/main" val="3045874594"/>
+      </p:ext>
+    </p:extLst>
+  </p:cSld>
+  <p:clrMapOvr>
+    <a:masterClrMapping/>
+  </p:clrMapOvr>
+</p:sld>
+</file>
+
+<file path=ppt/slides/slide21.xml><?xml version="1.0" encoding="utf-8"?>
+<p:sld xmlns:a="http://schemas.openxmlformats.org/drawingml/2006/main" xmlns:r="http://schemas.openxmlformats.org/officeDocument/2006/relationships" xmlns:p="http://schemas.openxmlformats.org/presentationml/2006/main">
+  <p:cSld>
+    <p:spTree>
+      <p:nvGrpSpPr>
+        <p:cNvPr id="1" name="">
+          <a:extLst>
+            <a:ext uri="{FF2B5EF4-FFF2-40B4-BE49-F238E27FC236}">
+              <a16:creationId xmlns:a16="http://schemas.microsoft.com/office/drawing/2014/main" id="{27CFBF8F-7015-D778-89D8-89248E9F4844}"/>
+            </a:ext>
+          </a:extLst>
+        </p:cNvPr>
+        <p:cNvGrpSpPr/>
+        <p:nvPr/>
+      </p:nvGrpSpPr>
+      <p:grpSpPr>
+        <a:xfrm>
+          <a:off x="0" y="0"/>
+          <a:ext cx="0" cy="0"/>
+          <a:chOff x="0" y="0"/>
+          <a:chExt cx="0" cy="0"/>
+        </a:xfrm>
+      </p:grpSpPr>
+      <p:sp>
+        <p:nvSpPr>
+          <p:cNvPr id="2" name="Titel 1">
+            <a:extLst>
+              <a:ext uri="{FF2B5EF4-FFF2-40B4-BE49-F238E27FC236}">
+                <a16:creationId xmlns:a16="http://schemas.microsoft.com/office/drawing/2014/main" id="{C7E3E6E2-45DD-9A23-6CF1-0558B9A44BFE}"/>
+              </a:ext>
+            </a:extLst>
+          </p:cNvPr>
+          <p:cNvSpPr>
+            <a:spLocks noGrp="1"/>
+          </p:cNvSpPr>
+          <p:nvPr>
+            <p:ph type="title"/>
+          </p:nvPr>
+        </p:nvSpPr>
+        <p:spPr/>
+        <p:txBody>
+          <a:bodyPr/>
+          <a:lstStyle/>
+          <a:p>
+            <a:r>
+              <a:rPr lang="de-AT" dirty="0"/>
+              <a:t>Clustering</a:t>
+            </a:r>
+          </a:p>
+        </p:txBody>
+      </p:sp>
+      <p:sp>
+        <p:nvSpPr>
+          <p:cNvPr id="3" name="Inhaltsplatzhalter 2">
+            <a:extLst>
+              <a:ext uri="{FF2B5EF4-FFF2-40B4-BE49-F238E27FC236}">
+                <a16:creationId xmlns:a16="http://schemas.microsoft.com/office/drawing/2014/main" id="{D17AB9E0-B6DF-64CE-E427-F4DB4DE62D7F}"/>
+              </a:ext>
+            </a:extLst>
+          </p:cNvPr>
+          <p:cNvSpPr>
+            <a:spLocks noGrp="1"/>
+          </p:cNvSpPr>
+          <p:nvPr>
+            <p:ph idx="1"/>
+          </p:nvPr>
+        </p:nvSpPr>
+        <p:spPr/>
+        <p:txBody>
+          <a:bodyPr/>
+          <a:lstStyle/>
+          <a:p>
+            <a:endParaRPr lang="de-AT"/>
+          </a:p>
+        </p:txBody>
+      </p:sp>
+    </p:spTree>
+    <p:extLst>
+      <p:ext uri="{BB962C8B-B14F-4D97-AF65-F5344CB8AC3E}">
+        <p14:creationId xmlns:p14="http://schemas.microsoft.com/office/powerpoint/2010/main" val="1252316802"/>
+      </p:ext>
+    </p:extLst>
+  </p:cSld>
+  <p:clrMapOvr>
+    <a:masterClrMapping/>
+  </p:clrMapOvr>
+</p:sld>
+</file>
+
+<file path=ppt/slides/slide22.xml><?xml version="1.0" encoding="utf-8"?>
+<p:sld xmlns:a="http://schemas.openxmlformats.org/drawingml/2006/main" xmlns:r="http://schemas.openxmlformats.org/officeDocument/2006/relationships" xmlns:p="http://schemas.openxmlformats.org/presentationml/2006/main">
+  <p:cSld>
+    <p:spTree>
+      <p:nvGrpSpPr>
+        <p:cNvPr id="1" name="">
+          <a:extLst>
+            <a:ext uri="{FF2B5EF4-FFF2-40B4-BE49-F238E27FC236}">
+              <a16:creationId xmlns:a16="http://schemas.microsoft.com/office/drawing/2014/main" id="{4B18B721-9BFC-744E-883E-B3E32E8BE4C3}"/>
+            </a:ext>
+          </a:extLst>
+        </p:cNvPr>
+        <p:cNvGrpSpPr/>
+        <p:nvPr/>
+      </p:nvGrpSpPr>
+      <p:grpSpPr>
+        <a:xfrm>
+          <a:off x="0" y="0"/>
+          <a:ext cx="0" cy="0"/>
+          <a:chOff x="0" y="0"/>
+          <a:chExt cx="0" cy="0"/>
+        </a:xfrm>
+      </p:grpSpPr>
+      <p:sp>
+        <p:nvSpPr>
+          <p:cNvPr id="2" name="Titel 1">
+            <a:extLst>
+              <a:ext uri="{FF2B5EF4-FFF2-40B4-BE49-F238E27FC236}">
+                <a16:creationId xmlns:a16="http://schemas.microsoft.com/office/drawing/2014/main" id="{CB24CB05-1090-5927-4CE5-D110E26AF0E5}"/>
+              </a:ext>
+            </a:extLst>
+          </p:cNvPr>
+          <p:cNvSpPr>
+            <a:spLocks noGrp="1"/>
+          </p:cNvSpPr>
+          <p:nvPr>
+            <p:ph type="title"/>
+          </p:nvPr>
+        </p:nvSpPr>
+        <p:spPr/>
+        <p:txBody>
+          <a:bodyPr/>
+          <a:lstStyle/>
+          <a:p>
+            <a:r>
+              <a:rPr lang="de-AT" dirty="0"/>
+              <a:t>Key </a:t>
+            </a:r>
+            <a:r>
+              <a:rPr lang="de-AT" dirty="0" err="1"/>
+              <a:t>Insights</a:t>
+            </a:r>
+            <a:r>
+              <a:rPr lang="de-AT" dirty="0"/>
+              <a:t> </a:t>
+            </a:r>
+          </a:p>
+        </p:txBody>
+      </p:sp>
+      <p:sp>
+        <p:nvSpPr>
+          <p:cNvPr id="3" name="Inhaltsplatzhalter 2">
+            <a:extLst>
+              <a:ext uri="{FF2B5EF4-FFF2-40B4-BE49-F238E27FC236}">
+                <a16:creationId xmlns:a16="http://schemas.microsoft.com/office/drawing/2014/main" id="{C6EA153C-E240-6400-81EF-0691E0D47AD5}"/>
+              </a:ext>
+            </a:extLst>
+          </p:cNvPr>
+          <p:cNvSpPr>
+            <a:spLocks noGrp="1"/>
+          </p:cNvSpPr>
+          <p:nvPr>
+            <p:ph idx="1"/>
+          </p:nvPr>
+        </p:nvSpPr>
+        <p:spPr/>
+        <p:txBody>
+          <a:bodyPr/>
+          <a:lstStyle/>
+          <a:p>
+            <a:endParaRPr lang="de-AT"/>
+          </a:p>
+        </p:txBody>
+      </p:sp>
+    </p:spTree>
+    <p:extLst>
+      <p:ext uri="{BB962C8B-B14F-4D97-AF65-F5344CB8AC3E}">
+        <p14:creationId xmlns:p14="http://schemas.microsoft.com/office/powerpoint/2010/main" val="3862909979"/>
+      </p:ext>
+    </p:extLst>
+  </p:cSld>
+  <p:clrMapOvr>
+    <a:masterClrMapping/>
+  </p:clrMapOvr>
+</p:sld>
+</file>
+
+<file path=ppt/slides/slide23.xml><?xml version="1.0" encoding="utf-8"?>
+<p:sld xmlns:a="http://schemas.openxmlformats.org/drawingml/2006/main" xmlns:r="http://schemas.openxmlformats.org/officeDocument/2006/relationships" xmlns:p="http://schemas.openxmlformats.org/presentationml/2006/main">
+  <p:cSld>
+    <p:spTree>
+      <p:nvGrpSpPr>
+        <p:cNvPr id="1" name="">
+          <a:extLst>
+            <a:ext uri="{FF2B5EF4-FFF2-40B4-BE49-F238E27FC236}">
+              <a16:creationId xmlns:a16="http://schemas.microsoft.com/office/drawing/2014/main" id="{54CF0727-A68F-DC52-1AC0-BD99A086DFC0}"/>
+            </a:ext>
+          </a:extLst>
+        </p:cNvPr>
+        <p:cNvGrpSpPr/>
+        <p:nvPr/>
+      </p:nvGrpSpPr>
+      <p:grpSpPr>
+        <a:xfrm>
+          <a:off x="0" y="0"/>
+          <a:ext cx="0" cy="0"/>
+          <a:chOff x="0" y="0"/>
+          <a:chExt cx="0" cy="0"/>
+        </a:xfrm>
+      </p:grpSpPr>
+      <p:sp>
+        <p:nvSpPr>
+          <p:cNvPr id="2" name="Titel 1">
+            <a:extLst>
+              <a:ext uri="{FF2B5EF4-FFF2-40B4-BE49-F238E27FC236}">
+                <a16:creationId xmlns:a16="http://schemas.microsoft.com/office/drawing/2014/main" id="{718B29EA-A57D-6C69-0CB4-339430472808}"/>
+              </a:ext>
+            </a:extLst>
+          </p:cNvPr>
+          <p:cNvSpPr>
+            <a:spLocks noGrp="1"/>
+          </p:cNvSpPr>
+          <p:nvPr>
+            <p:ph type="title"/>
+          </p:nvPr>
+        </p:nvSpPr>
+        <p:spPr/>
+        <p:txBody>
+          <a:bodyPr/>
+          <a:lstStyle/>
+          <a:p>
+            <a:r>
+              <a:rPr lang="de-AT" dirty="0"/>
+              <a:t>Wrap-Up &amp; </a:t>
+            </a:r>
+            <a:r>
+              <a:rPr lang="de-AT" dirty="0" err="1"/>
+              <a:t>Discussion</a:t>
+            </a:r>
+            <a:endParaRPr lang="de-AT" dirty="0"/>
+          </a:p>
+        </p:txBody>
+      </p:sp>
+      <p:sp>
+        <p:nvSpPr>
+          <p:cNvPr id="3" name="Inhaltsplatzhalter 2">
+            <a:extLst>
+              <a:ext uri="{FF2B5EF4-FFF2-40B4-BE49-F238E27FC236}">
+                <a16:creationId xmlns:a16="http://schemas.microsoft.com/office/drawing/2014/main" id="{F34A59FC-7C4F-B703-E613-487FC430C069}"/>
+              </a:ext>
+            </a:extLst>
+          </p:cNvPr>
+          <p:cNvSpPr>
+            <a:spLocks noGrp="1"/>
+          </p:cNvSpPr>
+          <p:nvPr>
+            <p:ph idx="1"/>
+          </p:nvPr>
+        </p:nvSpPr>
+        <p:spPr/>
+        <p:txBody>
+          <a:bodyPr/>
+          <a:lstStyle/>
+          <a:p>
+            <a:endParaRPr lang="de-AT"/>
+          </a:p>
+        </p:txBody>
+      </p:sp>
+    </p:spTree>
+    <p:extLst>
+      <p:ext uri="{BB962C8B-B14F-4D97-AF65-F5344CB8AC3E}">
+        <p14:creationId xmlns:p14="http://schemas.microsoft.com/office/powerpoint/2010/main" val="1028775870"/>
       </p:ext>
     </p:extLst>
   </p:cSld>

</xml_diff>